<commit_message>
Atualização no banco de dados em pagamento
</commit_message>
<xml_diff>
--- a/Fluxo_APP.pptx
+++ b/Fluxo_APP.pptx
@@ -104,6 +104,11 @@
       </a:defRPr>
     </a:lvl9pPr>
   </p:defaultTextStyle>
+  <p:extLst>
+    <p:ext uri="{EFAFB233-063F-42B5-8137-9DF3F51BA10A}">
+      <p15:sldGuideLst xmlns:p15="http://schemas.microsoft.com/office/powerpoint/2012/main"/>
+    </p:ext>
+  </p:extLst>
 </p:presentation>
 </file>
 
@@ -254,7 +259,7 @@
           <a:p>
             <a:fld id="{CD35BA1C-8ECB-4B6B-9E7B-F49135D3A8BA}" type="datetimeFigureOut">
               <a:rPr lang="pt-BR" smtClean="0"/>
-              <a:t>06/08/2020</a:t>
+              <a:t>01/09/2020</a:t>
             </a:fld>
             <a:endParaRPr lang="pt-BR"/>
           </a:p>
@@ -452,7 +457,7 @@
           <a:p>
             <a:fld id="{CD35BA1C-8ECB-4B6B-9E7B-F49135D3A8BA}" type="datetimeFigureOut">
               <a:rPr lang="pt-BR" smtClean="0"/>
-              <a:t>06/08/2020</a:t>
+              <a:t>01/09/2020</a:t>
             </a:fld>
             <a:endParaRPr lang="pt-BR"/>
           </a:p>
@@ -660,7 +665,7 @@
           <a:p>
             <a:fld id="{CD35BA1C-8ECB-4B6B-9E7B-F49135D3A8BA}" type="datetimeFigureOut">
               <a:rPr lang="pt-BR" smtClean="0"/>
-              <a:t>06/08/2020</a:t>
+              <a:t>01/09/2020</a:t>
             </a:fld>
             <a:endParaRPr lang="pt-BR"/>
           </a:p>
@@ -858,7 +863,7 @@
           <a:p>
             <a:fld id="{CD35BA1C-8ECB-4B6B-9E7B-F49135D3A8BA}" type="datetimeFigureOut">
               <a:rPr lang="pt-BR" smtClean="0"/>
-              <a:t>06/08/2020</a:t>
+              <a:t>01/09/2020</a:t>
             </a:fld>
             <a:endParaRPr lang="pt-BR"/>
           </a:p>
@@ -1133,7 +1138,7 @@
           <a:p>
             <a:fld id="{CD35BA1C-8ECB-4B6B-9E7B-F49135D3A8BA}" type="datetimeFigureOut">
               <a:rPr lang="pt-BR" smtClean="0"/>
-              <a:t>06/08/2020</a:t>
+              <a:t>01/09/2020</a:t>
             </a:fld>
             <a:endParaRPr lang="pt-BR"/>
           </a:p>
@@ -1398,7 +1403,7 @@
           <a:p>
             <a:fld id="{CD35BA1C-8ECB-4B6B-9E7B-F49135D3A8BA}" type="datetimeFigureOut">
               <a:rPr lang="pt-BR" smtClean="0"/>
-              <a:t>06/08/2020</a:t>
+              <a:t>01/09/2020</a:t>
             </a:fld>
             <a:endParaRPr lang="pt-BR"/>
           </a:p>
@@ -1810,7 +1815,7 @@
           <a:p>
             <a:fld id="{CD35BA1C-8ECB-4B6B-9E7B-F49135D3A8BA}" type="datetimeFigureOut">
               <a:rPr lang="pt-BR" smtClean="0"/>
-              <a:t>06/08/2020</a:t>
+              <a:t>01/09/2020</a:t>
             </a:fld>
             <a:endParaRPr lang="pt-BR"/>
           </a:p>
@@ -1951,7 +1956,7 @@
           <a:p>
             <a:fld id="{CD35BA1C-8ECB-4B6B-9E7B-F49135D3A8BA}" type="datetimeFigureOut">
               <a:rPr lang="pt-BR" smtClean="0"/>
-              <a:t>06/08/2020</a:t>
+              <a:t>01/09/2020</a:t>
             </a:fld>
             <a:endParaRPr lang="pt-BR"/>
           </a:p>
@@ -2064,7 +2069,7 @@
           <a:p>
             <a:fld id="{CD35BA1C-8ECB-4B6B-9E7B-F49135D3A8BA}" type="datetimeFigureOut">
               <a:rPr lang="pt-BR" smtClean="0"/>
-              <a:t>06/08/2020</a:t>
+              <a:t>01/09/2020</a:t>
             </a:fld>
             <a:endParaRPr lang="pt-BR"/>
           </a:p>
@@ -2375,7 +2380,7 @@
           <a:p>
             <a:fld id="{CD35BA1C-8ECB-4B6B-9E7B-F49135D3A8BA}" type="datetimeFigureOut">
               <a:rPr lang="pt-BR" smtClean="0"/>
-              <a:t>06/08/2020</a:t>
+              <a:t>01/09/2020</a:t>
             </a:fld>
             <a:endParaRPr lang="pt-BR"/>
           </a:p>
@@ -2663,7 +2668,7 @@
           <a:p>
             <a:fld id="{CD35BA1C-8ECB-4B6B-9E7B-F49135D3A8BA}" type="datetimeFigureOut">
               <a:rPr lang="pt-BR" smtClean="0"/>
-              <a:t>06/08/2020</a:t>
+              <a:t>01/09/2020</a:t>
             </a:fld>
             <a:endParaRPr lang="pt-BR"/>
           </a:p>
@@ -2904,7 +2909,7 @@
           <a:p>
             <a:fld id="{CD35BA1C-8ECB-4B6B-9E7B-F49135D3A8BA}" type="datetimeFigureOut">
               <a:rPr lang="pt-BR" smtClean="0"/>
-              <a:t>06/08/2020</a:t>
+              <a:t>01/09/2020</a:t>
             </a:fld>
             <a:endParaRPr lang="pt-BR"/>
           </a:p>
@@ -3323,10 +3328,10 @@
       </p:grpSpPr>
       <p:sp>
         <p:nvSpPr>
-          <p:cNvPr id="6" name="Retângulo 5">
-            <a:extLst>
-              <a:ext uri="{FF2B5EF4-FFF2-40B4-BE49-F238E27FC236}">
-                <a16:creationId xmlns:a16="http://schemas.microsoft.com/office/drawing/2014/main" id="{1408CC38-289F-4E8C-A77E-5D12F28E74CE}"/>
+          <p:cNvPr id="7" name="Retângulo 6">
+            <a:extLst>
+              <a:ext uri="{FF2B5EF4-FFF2-40B4-BE49-F238E27FC236}">
+                <a16:creationId xmlns:a16="http://schemas.microsoft.com/office/drawing/2014/main" id="{E8D1EE2A-5D17-4EFB-8A2E-3CCBD10A894B}"/>
               </a:ext>
             </a:extLst>
           </p:cNvPr>
@@ -3335,7 +3340,7 @@
         </p:nvSpPr>
         <p:spPr>
           <a:xfrm>
-            <a:off x="1977189" y="226597"/>
+            <a:off x="1643771" y="1067248"/>
             <a:ext cx="1070111" cy="502520"/>
           </a:xfrm>
           <a:prstGeom prst="rect">
@@ -3344,15 +3349,15 @@
         </p:spPr>
         <p:style>
           <a:lnRef idx="2">
-            <a:schemeClr val="accent1">
+            <a:schemeClr val="accent2">
               <a:shade val="50000"/>
             </a:schemeClr>
           </a:lnRef>
           <a:fillRef idx="1">
-            <a:schemeClr val="accent1"/>
+            <a:schemeClr val="accent2"/>
           </a:fillRef>
           <a:effectRef idx="0">
-            <a:schemeClr val="accent1"/>
+            <a:schemeClr val="accent2"/>
           </a:effectRef>
           <a:fontRef idx="minor">
             <a:schemeClr val="lt1"/>
@@ -3365,17 +3370,17 @@
             <a:pPr algn="ctr"/>
             <a:r>
               <a:rPr lang="pt-BR" sz="1200" dirty="0"/>
-              <a:t>Apresentação</a:t>
-            </a:r>
-          </a:p>
-        </p:txBody>
-      </p:sp>
-      <p:sp>
-        <p:nvSpPr>
-          <p:cNvPr id="7" name="Retângulo 6">
-            <a:extLst>
-              <a:ext uri="{FF2B5EF4-FFF2-40B4-BE49-F238E27FC236}">
-                <a16:creationId xmlns:a16="http://schemas.microsoft.com/office/drawing/2014/main" id="{E8D1EE2A-5D17-4EFB-8A2E-3CCBD10A894B}"/>
+              <a:t>Login</a:t>
+            </a:r>
+          </a:p>
+        </p:txBody>
+      </p:sp>
+      <p:sp>
+        <p:nvSpPr>
+          <p:cNvPr id="8" name="Retângulo 7">
+            <a:extLst>
+              <a:ext uri="{FF2B5EF4-FFF2-40B4-BE49-F238E27FC236}">
+                <a16:creationId xmlns:a16="http://schemas.microsoft.com/office/drawing/2014/main" id="{89CF22C6-8363-4663-9A87-57898DBBE55C}"/>
               </a:ext>
             </a:extLst>
           </p:cNvPr>
@@ -3384,8 +3389,8 @@
         </p:nvSpPr>
         <p:spPr>
           <a:xfrm>
-            <a:off x="733926" y="1213186"/>
-            <a:ext cx="1070111" cy="502520"/>
+            <a:off x="2972510" y="1349068"/>
+            <a:ext cx="1085538" cy="825675"/>
           </a:xfrm>
           <a:prstGeom prst="rect">
             <a:avLst/>
@@ -3393,15 +3398,15 @@
         </p:spPr>
         <p:style>
           <a:lnRef idx="2">
-            <a:schemeClr val="accent1">
+            <a:schemeClr val="accent4">
               <a:shade val="50000"/>
             </a:schemeClr>
           </a:lnRef>
           <a:fillRef idx="1">
-            <a:schemeClr val="accent1"/>
+            <a:schemeClr val="accent4"/>
           </a:fillRef>
           <a:effectRef idx="0">
-            <a:schemeClr val="accent1"/>
+            <a:schemeClr val="accent4"/>
           </a:effectRef>
           <a:fontRef idx="minor">
             <a:schemeClr val="lt1"/>
@@ -3414,17 +3419,28 @@
             <a:pPr algn="ctr"/>
             <a:r>
               <a:rPr lang="pt-BR" sz="1200" dirty="0"/>
-              <a:t>Login</a:t>
-            </a:r>
-          </a:p>
-        </p:txBody>
-      </p:sp>
-      <p:sp>
-        <p:nvSpPr>
-          <p:cNvPr id="8" name="Retângulo 7">
-            <a:extLst>
-              <a:ext uri="{FF2B5EF4-FFF2-40B4-BE49-F238E27FC236}">
-                <a16:creationId xmlns:a16="http://schemas.microsoft.com/office/drawing/2014/main" id="{89CF22C6-8363-4663-9A87-57898DBBE55C}"/>
+              <a:t>Inicial</a:t>
+            </a:r>
+          </a:p>
+          <a:p>
+            <a:pPr algn="ctr"/>
+            <a:r>
+              <a:rPr lang="pt-BR" sz="1200" b="1" dirty="0">
+                <a:solidFill>
+                  <a:schemeClr val="tx1"/>
+                </a:solidFill>
+              </a:rPr>
+              <a:t>produtos em destaque</a:t>
+            </a:r>
+          </a:p>
+        </p:txBody>
+      </p:sp>
+      <p:sp>
+        <p:nvSpPr>
+          <p:cNvPr id="9" name="Retângulo 8">
+            <a:extLst>
+              <a:ext uri="{FF2B5EF4-FFF2-40B4-BE49-F238E27FC236}">
+                <a16:creationId xmlns:a16="http://schemas.microsoft.com/office/drawing/2014/main" id="{C3A896E6-DAAB-49E6-925B-3261E4D3F0D6}"/>
               </a:ext>
             </a:extLst>
           </p:cNvPr>
@@ -3433,7 +3449,7 @@
         </p:nvSpPr>
         <p:spPr>
           <a:xfrm>
-            <a:off x="2791326" y="1512771"/>
+            <a:off x="1643771" y="2015291"/>
             <a:ext cx="1070111" cy="502520"/>
           </a:xfrm>
           <a:prstGeom prst="rect">
@@ -3442,15 +3458,15 @@
         </p:spPr>
         <p:style>
           <a:lnRef idx="2">
-            <a:schemeClr val="accent1">
+            <a:schemeClr val="accent2">
               <a:shade val="50000"/>
             </a:schemeClr>
           </a:lnRef>
           <a:fillRef idx="1">
-            <a:schemeClr val="accent1"/>
+            <a:schemeClr val="accent2"/>
           </a:fillRef>
           <a:effectRef idx="0">
-            <a:schemeClr val="accent1"/>
+            <a:schemeClr val="accent2"/>
           </a:effectRef>
           <a:fontRef idx="minor">
             <a:schemeClr val="lt1"/>
@@ -3463,116 +3479,11 @@
             <a:pPr algn="ctr"/>
             <a:r>
               <a:rPr lang="pt-BR" sz="1200" dirty="0"/>
-              <a:t>Inicial</a:t>
-            </a:r>
-          </a:p>
-          <a:p>
-            <a:pPr algn="ctr"/>
-            <a:r>
-              <a:rPr lang="pt-BR" sz="1200" dirty="0">
-                <a:solidFill>
-                  <a:srgbClr val="FFFF00"/>
-                </a:solidFill>
-              </a:rPr>
-              <a:t>(produtos em destaque)</a:t>
-            </a:r>
-          </a:p>
-        </p:txBody>
-      </p:sp>
-      <p:sp>
-        <p:nvSpPr>
-          <p:cNvPr id="9" name="Retângulo 8">
-            <a:extLst>
-              <a:ext uri="{FF2B5EF4-FFF2-40B4-BE49-F238E27FC236}">
-                <a16:creationId xmlns:a16="http://schemas.microsoft.com/office/drawing/2014/main" id="{C3A896E6-DAAB-49E6-925B-3261E4D3F0D6}"/>
-              </a:ext>
-            </a:extLst>
-          </p:cNvPr>
-          <p:cNvSpPr/>
-          <p:nvPr/>
-        </p:nvSpPr>
-        <p:spPr>
-          <a:xfrm>
-            <a:off x="733925" y="2015291"/>
-            <a:ext cx="1070111" cy="502520"/>
-          </a:xfrm>
-          <a:prstGeom prst="rect">
-            <a:avLst/>
-          </a:prstGeom>
-        </p:spPr>
-        <p:style>
-          <a:lnRef idx="2">
-            <a:schemeClr val="accent1">
-              <a:shade val="50000"/>
-            </a:schemeClr>
-          </a:lnRef>
-          <a:fillRef idx="1">
-            <a:schemeClr val="accent1"/>
-          </a:fillRef>
-          <a:effectRef idx="0">
-            <a:schemeClr val="accent1"/>
-          </a:effectRef>
-          <a:fontRef idx="minor">
-            <a:schemeClr val="lt1"/>
-          </a:fontRef>
-        </p:style>
-        <p:txBody>
-          <a:bodyPr rtlCol="0" anchor="ctr"/>
-          <a:lstStyle/>
-          <a:p>
-            <a:pPr algn="ctr"/>
-            <a:r>
-              <a:rPr lang="pt-BR" sz="1200" dirty="0"/>
               <a:t>Cadastrar</a:t>
             </a:r>
           </a:p>
         </p:txBody>
       </p:sp>
-      <p:cxnSp>
-        <p:nvCxnSpPr>
-          <p:cNvPr id="11" name="Conector: Angulado 10">
-            <a:extLst>
-              <a:ext uri="{FF2B5EF4-FFF2-40B4-BE49-F238E27FC236}">
-                <a16:creationId xmlns:a16="http://schemas.microsoft.com/office/drawing/2014/main" id="{2E74DA2F-BAF6-4DA1-853D-AA517E2F70D2}"/>
-              </a:ext>
-            </a:extLst>
-          </p:cNvPr>
-          <p:cNvCxnSpPr>
-            <a:stCxn id="6" idx="2"/>
-            <a:endCxn id="8" idx="0"/>
-          </p:cNvCxnSpPr>
-          <p:nvPr/>
-        </p:nvCxnSpPr>
-        <p:spPr>
-          <a:xfrm rot="16200000" flipH="1">
-            <a:off x="2527486" y="713875"/>
-            <a:ext cx="783654" cy="814137"/>
-          </a:xfrm>
-          <a:prstGeom prst="bentConnector3">
-            <a:avLst/>
-          </a:prstGeom>
-          <a:ln w="19050">
-            <a:solidFill>
-              <a:srgbClr val="FF0000"/>
-            </a:solidFill>
-            <a:tailEnd type="triangle"/>
-          </a:ln>
-        </p:spPr>
-        <p:style>
-          <a:lnRef idx="1">
-            <a:schemeClr val="accent1"/>
-          </a:lnRef>
-          <a:fillRef idx="0">
-            <a:schemeClr val="accent1"/>
-          </a:fillRef>
-          <a:effectRef idx="0">
-            <a:schemeClr val="accent1"/>
-          </a:effectRef>
-          <a:fontRef idx="minor">
-            <a:schemeClr val="tx1"/>
-          </a:fontRef>
-        </p:style>
-      </p:cxnSp>
       <p:cxnSp>
         <p:nvCxnSpPr>
           <p:cNvPr id="12" name="Conector: Angulado 11">
@@ -3584,35 +3495,32 @@
           </p:cNvPr>
           <p:cNvCxnSpPr>
             <a:cxnSpLocks/>
-            <a:stCxn id="6" idx="2"/>
+            <a:stCxn id="2" idx="2"/>
             <a:endCxn id="7" idx="0"/>
           </p:cNvCxnSpPr>
           <p:nvPr/>
         </p:nvCxnSpPr>
         <p:spPr>
-          <a:xfrm rot="5400000">
-            <a:off x="1648580" y="349520"/>
-            <a:ext cx="484069" cy="1243263"/>
-          </a:xfrm>
-          <a:prstGeom prst="bentConnector3">
+          <a:xfrm rot="10800000" flipV="1">
+            <a:off x="2178827" y="515236"/>
+            <a:ext cx="956204" cy="552012"/>
+          </a:xfrm>
+          <a:prstGeom prst="bentConnector2">
             <a:avLst/>
           </a:prstGeom>
-          <a:ln w="19050">
-            <a:solidFill>
-              <a:srgbClr val="FF0000"/>
-            </a:solidFill>
+          <a:ln>
             <a:tailEnd type="triangle"/>
           </a:ln>
         </p:spPr>
         <p:style>
-          <a:lnRef idx="1">
-            <a:schemeClr val="accent1"/>
+          <a:lnRef idx="3">
+            <a:schemeClr val="accent4"/>
           </a:lnRef>
           <a:fillRef idx="0">
-            <a:schemeClr val="accent1"/>
+            <a:schemeClr val="accent4"/>
           </a:fillRef>
-          <a:effectRef idx="0">
-            <a:schemeClr val="accent1"/>
+          <a:effectRef idx="2">
+            <a:schemeClr val="accent4"/>
           </a:effectRef>
           <a:fontRef idx="minor">
             <a:schemeClr val="tx1"/>
@@ -3637,30 +3545,27 @@
         </p:nvCxnSpPr>
         <p:spPr>
           <a:xfrm>
-            <a:off x="1804037" y="1464446"/>
-            <a:ext cx="987289" cy="299585"/>
+            <a:off x="2713882" y="1318508"/>
+            <a:ext cx="258628" cy="443398"/>
           </a:xfrm>
           <a:prstGeom prst="bentConnector3">
             <a:avLst>
               <a:gd name="adj1" fmla="val 50000"/>
             </a:avLst>
           </a:prstGeom>
-          <a:ln w="19050">
-            <a:solidFill>
-              <a:srgbClr val="FF0000"/>
-            </a:solidFill>
+          <a:ln>
             <a:tailEnd type="triangle"/>
           </a:ln>
         </p:spPr>
         <p:style>
-          <a:lnRef idx="1">
-            <a:schemeClr val="accent1"/>
+          <a:lnRef idx="3">
+            <a:schemeClr val="accent4"/>
           </a:lnRef>
           <a:fillRef idx="0">
-            <a:schemeClr val="accent1"/>
+            <a:schemeClr val="accent4"/>
           </a:fillRef>
-          <a:effectRef idx="0">
-            <a:schemeClr val="accent1"/>
+          <a:effectRef idx="2">
+            <a:schemeClr val="accent4"/>
           </a:effectRef>
           <a:fontRef idx="minor">
             <a:schemeClr val="tx1"/>
@@ -3685,30 +3590,27 @@
         </p:nvCxnSpPr>
         <p:spPr>
           <a:xfrm rot="10800000" flipV="1">
-            <a:off x="733926" y="1464445"/>
-            <a:ext cx="1" cy="802105"/>
+            <a:off x="1643771" y="1318507"/>
+            <a:ext cx="12700" cy="948043"/>
           </a:xfrm>
           <a:prstGeom prst="bentConnector3">
             <a:avLst>
-              <a:gd name="adj1" fmla="val 22860100000"/>
+              <a:gd name="adj1" fmla="val 1059811"/>
             </a:avLst>
           </a:prstGeom>
-          <a:ln w="19050">
-            <a:solidFill>
-              <a:srgbClr val="FF0000"/>
-            </a:solidFill>
+          <a:ln>
             <a:tailEnd type="triangle"/>
           </a:ln>
         </p:spPr>
         <p:style>
-          <a:lnRef idx="1">
-            <a:schemeClr val="accent1"/>
+          <a:lnRef idx="3">
+            <a:schemeClr val="accent4"/>
           </a:lnRef>
           <a:fillRef idx="0">
-            <a:schemeClr val="accent1"/>
+            <a:schemeClr val="accent4"/>
           </a:fillRef>
-          <a:effectRef idx="0">
-            <a:schemeClr val="accent1"/>
+          <a:effectRef idx="2">
+            <a:schemeClr val="accent4"/>
           </a:effectRef>
           <a:fontRef idx="minor">
             <a:schemeClr val="tx1"/>
@@ -3733,30 +3635,27 @@
         </p:nvCxnSpPr>
         <p:spPr>
           <a:xfrm flipV="1">
-            <a:off x="1804036" y="1764031"/>
-            <a:ext cx="987290" cy="502520"/>
+            <a:off x="2713882" y="1761906"/>
+            <a:ext cx="258628" cy="504645"/>
           </a:xfrm>
           <a:prstGeom prst="bentConnector3">
             <a:avLst>
               <a:gd name="adj1" fmla="val 50000"/>
             </a:avLst>
           </a:prstGeom>
-          <a:ln w="19050">
-            <a:solidFill>
-              <a:srgbClr val="FF0000"/>
-            </a:solidFill>
+          <a:ln>
             <a:tailEnd type="triangle"/>
           </a:ln>
         </p:spPr>
         <p:style>
-          <a:lnRef idx="1">
-            <a:schemeClr val="accent1"/>
+          <a:lnRef idx="3">
+            <a:schemeClr val="accent4"/>
           </a:lnRef>
           <a:fillRef idx="0">
-            <a:schemeClr val="accent1"/>
+            <a:schemeClr val="accent4"/>
           </a:fillRef>
-          <a:effectRef idx="0">
-            <a:schemeClr val="accent1"/>
+          <a:effectRef idx="2">
+            <a:schemeClr val="accent4"/>
           </a:effectRef>
           <a:fontRef idx="minor">
             <a:schemeClr val="tx1"/>
@@ -3777,7 +3676,7 @@
         </p:nvSpPr>
         <p:spPr>
           <a:xfrm>
-            <a:off x="4061008" y="2172102"/>
+            <a:off x="4058048" y="2333680"/>
             <a:ext cx="1070111" cy="502520"/>
           </a:xfrm>
           <a:prstGeom prst="rect">
@@ -3786,15 +3685,15 @@
         </p:spPr>
         <p:style>
           <a:lnRef idx="2">
-            <a:schemeClr val="accent1">
+            <a:schemeClr val="accent2">
               <a:shade val="50000"/>
             </a:schemeClr>
           </a:lnRef>
           <a:fillRef idx="1">
-            <a:schemeClr val="accent1"/>
+            <a:schemeClr val="accent2"/>
           </a:fillRef>
           <a:effectRef idx="0">
-            <a:schemeClr val="accent1"/>
+            <a:schemeClr val="accent2"/>
           </a:effectRef>
           <a:fontRef idx="minor">
             <a:schemeClr val="lt1"/>
@@ -3835,28 +3734,25 @@
         </p:nvCxnSpPr>
         <p:spPr>
           <a:xfrm rot="16200000" flipH="1">
-            <a:off x="3489660" y="1852013"/>
-            <a:ext cx="408071" cy="734626"/>
+            <a:off x="3581565" y="2108456"/>
+            <a:ext cx="410197" cy="542769"/>
           </a:xfrm>
           <a:prstGeom prst="bentConnector2">
             <a:avLst/>
           </a:prstGeom>
-          <a:ln w="19050">
-            <a:solidFill>
-              <a:srgbClr val="FF0000"/>
-            </a:solidFill>
+          <a:ln>
             <a:tailEnd type="triangle"/>
           </a:ln>
         </p:spPr>
         <p:style>
-          <a:lnRef idx="1">
-            <a:schemeClr val="accent1"/>
+          <a:lnRef idx="3">
+            <a:schemeClr val="accent4"/>
           </a:lnRef>
           <a:fillRef idx="0">
-            <a:schemeClr val="accent1"/>
+            <a:schemeClr val="accent4"/>
           </a:fillRef>
-          <a:effectRef idx="0">
-            <a:schemeClr val="accent1"/>
+          <a:effectRef idx="2">
+            <a:schemeClr val="accent4"/>
           </a:effectRef>
           <a:fontRef idx="minor">
             <a:schemeClr val="tx1"/>
@@ -3877,7 +3773,7 @@
         </p:nvSpPr>
         <p:spPr>
           <a:xfrm>
-            <a:off x="5475469" y="2172102"/>
+            <a:off x="5452601" y="2075097"/>
             <a:ext cx="1070111" cy="502520"/>
           </a:xfrm>
           <a:prstGeom prst="rect">
@@ -3886,15 +3782,15 @@
         </p:spPr>
         <p:style>
           <a:lnRef idx="2">
-            <a:schemeClr val="accent1">
+            <a:schemeClr val="accent2">
               <a:shade val="50000"/>
             </a:schemeClr>
           </a:lnRef>
           <a:fillRef idx="1">
-            <a:schemeClr val="accent1"/>
+            <a:schemeClr val="accent2"/>
           </a:fillRef>
           <a:effectRef idx="0">
-            <a:schemeClr val="accent1"/>
+            <a:schemeClr val="accent2"/>
           </a:effectRef>
           <a:fontRef idx="minor">
             <a:schemeClr val="lt1"/>
@@ -3931,7 +3827,7 @@
         </p:nvSpPr>
         <p:spPr>
           <a:xfrm>
-            <a:off x="6889930" y="2172102"/>
+            <a:off x="5451603" y="3087186"/>
             <a:ext cx="1070111" cy="502520"/>
           </a:xfrm>
           <a:prstGeom prst="rect">
@@ -3939,16 +3835,14 @@
           </a:prstGeom>
         </p:spPr>
         <p:style>
-          <a:lnRef idx="2">
-            <a:schemeClr val="accent1">
-              <a:shade val="50000"/>
-            </a:schemeClr>
+          <a:lnRef idx="1">
+            <a:schemeClr val="accent4"/>
           </a:lnRef>
-          <a:fillRef idx="1">
-            <a:schemeClr val="accent1"/>
+          <a:fillRef idx="3">
+            <a:schemeClr val="accent4"/>
           </a:fillRef>
-          <a:effectRef idx="0">
-            <a:schemeClr val="accent1"/>
+          <a:effectRef idx="2">
+            <a:schemeClr val="accent4"/>
           </a:effectRef>
           <a:fontRef idx="minor">
             <a:schemeClr val="lt1"/>
@@ -3960,9 +3854,9 @@
           <a:p>
             <a:pPr algn="ctr"/>
             <a:r>
-              <a:rPr lang="pt-BR" sz="1200" dirty="0">
+              <a:rPr lang="pt-BR" sz="1200" b="1" dirty="0">
                 <a:solidFill>
-                  <a:schemeClr val="bg1"/>
+                  <a:schemeClr val="tx1"/>
                 </a:solidFill>
               </a:rPr>
               <a:t>Carrinho</a:t>
@@ -3984,7 +3878,7 @@
         </p:nvSpPr>
         <p:spPr>
           <a:xfrm>
-            <a:off x="8228191" y="2172102"/>
+            <a:off x="7052437" y="3093559"/>
             <a:ext cx="1070111" cy="502520"/>
           </a:xfrm>
           <a:prstGeom prst="rect">
@@ -3993,15 +3887,15 @@
         </p:spPr>
         <p:style>
           <a:lnRef idx="2">
-            <a:schemeClr val="accent1">
+            <a:schemeClr val="accent2">
               <a:shade val="50000"/>
             </a:schemeClr>
           </a:lnRef>
           <a:fillRef idx="1">
-            <a:schemeClr val="accent1"/>
+            <a:schemeClr val="accent2"/>
           </a:fillRef>
           <a:effectRef idx="0">
-            <a:schemeClr val="accent1"/>
+            <a:schemeClr val="accent2"/>
           </a:effectRef>
           <a:fontRef idx="minor">
             <a:schemeClr val="lt1"/>
@@ -4037,7 +3931,7 @@
         </p:nvSpPr>
         <p:spPr>
           <a:xfrm>
-            <a:off x="9566452" y="2172102"/>
+            <a:off x="8653271" y="3087186"/>
             <a:ext cx="1070111" cy="502520"/>
           </a:xfrm>
           <a:prstGeom prst="rect">
@@ -4046,15 +3940,15 @@
         </p:spPr>
         <p:style>
           <a:lnRef idx="2">
-            <a:schemeClr val="accent1">
+            <a:schemeClr val="accent4">
               <a:shade val="50000"/>
             </a:schemeClr>
           </a:lnRef>
           <a:fillRef idx="1">
-            <a:schemeClr val="accent1"/>
+            <a:schemeClr val="accent4"/>
           </a:fillRef>
           <a:effectRef idx="0">
-            <a:schemeClr val="accent1"/>
+            <a:schemeClr val="accent4"/>
           </a:effectRef>
           <a:fontRef idx="minor">
             <a:schemeClr val="lt1"/>
@@ -4066,9 +3960,9 @@
           <a:p>
             <a:pPr algn="ctr"/>
             <a:r>
-              <a:rPr lang="pt-BR" sz="1200" dirty="0">
+              <a:rPr lang="pt-BR" sz="1200" b="1" dirty="0">
                 <a:solidFill>
-                  <a:schemeClr val="bg1"/>
+                  <a:schemeClr val="tx1"/>
                 </a:solidFill>
               </a:rPr>
               <a:t>Pagamento</a:t>
@@ -4090,24 +3984,28 @@
         </p:nvSpPr>
         <p:spPr>
           <a:xfrm>
-            <a:off x="10778032" y="2172102"/>
+            <a:off x="8653270" y="2174741"/>
             <a:ext cx="1070111" cy="502520"/>
           </a:xfrm>
           <a:prstGeom prst="rect">
             <a:avLst/>
           </a:prstGeom>
+          <a:solidFill>
+            <a:schemeClr val="accent6"/>
+          </a:solidFill>
+          <a:ln>
+            <a:noFill/>
+          </a:ln>
         </p:spPr>
         <p:style>
-          <a:lnRef idx="2">
-            <a:schemeClr val="accent1">
-              <a:shade val="50000"/>
-            </a:schemeClr>
+          <a:lnRef idx="0">
+            <a:scrgbClr r="0" g="0" b="0"/>
           </a:lnRef>
-          <a:fillRef idx="1">
-            <a:schemeClr val="accent1"/>
+          <a:fillRef idx="0">
+            <a:scrgbClr r="0" g="0" b="0"/>
           </a:fillRef>
           <a:effectRef idx="0">
-            <a:schemeClr val="accent1"/>
+            <a:scrgbClr r="0" g="0" b="0"/>
           </a:effectRef>
           <a:fontRef idx="minor">
             <a:schemeClr val="lt1"/>
@@ -4119,12 +4017,23 @@
           <a:p>
             <a:pPr algn="ctr"/>
             <a:r>
-              <a:rPr lang="pt-BR" sz="1200" dirty="0">
+              <a:rPr lang="pt-BR" sz="1200" b="1" dirty="0">
                 <a:solidFill>
-                  <a:schemeClr val="bg1"/>
+                  <a:schemeClr val="tx1"/>
                 </a:solidFill>
               </a:rPr>
               <a:t>Confirmação</a:t>
+            </a:r>
+          </a:p>
+          <a:p>
+            <a:pPr algn="ctr"/>
+            <a:r>
+              <a:rPr lang="pt-BR" sz="1200" b="1" dirty="0">
+                <a:solidFill>
+                  <a:schemeClr val="tx1"/>
+                </a:solidFill>
+              </a:rPr>
+              <a:t>Pagamento</a:t>
             </a:r>
           </a:p>
         </p:txBody>
@@ -4147,28 +4056,25 @@
         </p:nvCxnSpPr>
         <p:spPr>
           <a:xfrm>
-            <a:off x="3861437" y="1764031"/>
-            <a:ext cx="2149088" cy="408071"/>
+            <a:off x="4058048" y="1761906"/>
+            <a:ext cx="1929609" cy="313191"/>
           </a:xfrm>
           <a:prstGeom prst="bentConnector2">
             <a:avLst/>
           </a:prstGeom>
-          <a:ln w="19050">
-            <a:solidFill>
-              <a:srgbClr val="FF0000"/>
-            </a:solidFill>
+          <a:ln>
             <a:tailEnd type="triangle"/>
           </a:ln>
         </p:spPr>
         <p:style>
-          <a:lnRef idx="1">
-            <a:schemeClr val="accent1"/>
+          <a:lnRef idx="3">
+            <a:schemeClr val="accent4"/>
           </a:lnRef>
           <a:fillRef idx="0">
-            <a:schemeClr val="accent1"/>
+            <a:schemeClr val="accent4"/>
           </a:fillRef>
-          <a:effectRef idx="0">
-            <a:schemeClr val="accent1"/>
+          <a:effectRef idx="2">
+            <a:schemeClr val="accent4"/>
           </a:effectRef>
           <a:fontRef idx="minor">
             <a:schemeClr val="tx1"/>
@@ -4192,224 +4098,34 @@
           <p:nvPr/>
         </p:nvCxnSpPr>
         <p:spPr>
-          <a:xfrm>
-            <a:off x="5131119" y="2423362"/>
-            <a:ext cx="344350" cy="12700"/>
+          <a:xfrm flipV="1">
+            <a:off x="5128159" y="2326357"/>
+            <a:ext cx="324442" cy="258583"/>
           </a:xfrm>
           <a:prstGeom prst="bentConnector3">
             <a:avLst>
               <a:gd name="adj1" fmla="val 50000"/>
             </a:avLst>
           </a:prstGeom>
-          <a:ln w="19050">
-            <a:solidFill>
-              <a:srgbClr val="FF0000"/>
-            </a:solidFill>
+          <a:ln>
             <a:tailEnd type="triangle"/>
           </a:ln>
         </p:spPr>
         <p:style>
-          <a:lnRef idx="1">
-            <a:schemeClr val="accent1"/>
+          <a:lnRef idx="3">
+            <a:schemeClr val="accent4"/>
           </a:lnRef>
           <a:fillRef idx="0">
-            <a:schemeClr val="accent1"/>
+            <a:schemeClr val="accent4"/>
           </a:fillRef>
-          <a:effectRef idx="0">
-            <a:schemeClr val="accent1"/>
+          <a:effectRef idx="2">
+            <a:schemeClr val="accent4"/>
           </a:effectRef>
           <a:fontRef idx="minor">
             <a:schemeClr val="tx1"/>
           </a:fontRef>
         </p:style>
       </p:cxnSp>
-      <p:cxnSp>
-        <p:nvCxnSpPr>
-          <p:cNvPr id="47" name="Conector: Angulado 46">
-            <a:extLst>
-              <a:ext uri="{FF2B5EF4-FFF2-40B4-BE49-F238E27FC236}">
-                <a16:creationId xmlns:a16="http://schemas.microsoft.com/office/drawing/2014/main" id="{A36BCF91-9790-4B91-B8E9-00300631AB52}"/>
-              </a:ext>
-            </a:extLst>
-          </p:cNvPr>
-          <p:cNvCxnSpPr>
-            <a:cxnSpLocks/>
-          </p:cNvCxnSpPr>
-          <p:nvPr/>
-        </p:nvCxnSpPr>
-        <p:spPr>
-          <a:xfrm>
-            <a:off x="6555102" y="2423362"/>
-            <a:ext cx="344350" cy="12700"/>
-          </a:xfrm>
-          <a:prstGeom prst="bentConnector3">
-            <a:avLst>
-              <a:gd name="adj1" fmla="val 50000"/>
-            </a:avLst>
-          </a:prstGeom>
-          <a:ln w="19050">
-            <a:solidFill>
-              <a:srgbClr val="FF0000"/>
-            </a:solidFill>
-            <a:tailEnd type="triangle"/>
-          </a:ln>
-        </p:spPr>
-        <p:style>
-          <a:lnRef idx="1">
-            <a:schemeClr val="accent1"/>
-          </a:lnRef>
-          <a:fillRef idx="0">
-            <a:schemeClr val="accent1"/>
-          </a:fillRef>
-          <a:effectRef idx="0">
-            <a:schemeClr val="accent1"/>
-          </a:effectRef>
-          <a:fontRef idx="minor">
-            <a:schemeClr val="tx1"/>
-          </a:fontRef>
-        </p:style>
-      </p:cxnSp>
-      <p:cxnSp>
-        <p:nvCxnSpPr>
-          <p:cNvPr id="48" name="Conector: Angulado 47">
-            <a:extLst>
-              <a:ext uri="{FF2B5EF4-FFF2-40B4-BE49-F238E27FC236}">
-                <a16:creationId xmlns:a16="http://schemas.microsoft.com/office/drawing/2014/main" id="{EE1761C2-6255-438A-8287-826503EC6049}"/>
-              </a:ext>
-            </a:extLst>
-          </p:cNvPr>
-          <p:cNvCxnSpPr>
-            <a:cxnSpLocks/>
-            <a:endCxn id="40" idx="1"/>
-          </p:cNvCxnSpPr>
-          <p:nvPr/>
-        </p:nvCxnSpPr>
-        <p:spPr>
-          <a:xfrm flipV="1">
-            <a:off x="7949336" y="2423362"/>
-            <a:ext cx="278855" cy="12700"/>
-          </a:xfrm>
-          <a:prstGeom prst="bentConnector3">
-            <a:avLst>
-              <a:gd name="adj1" fmla="val 50000"/>
-            </a:avLst>
-          </a:prstGeom>
-          <a:ln w="19050">
-            <a:solidFill>
-              <a:srgbClr val="FF0000"/>
-            </a:solidFill>
-            <a:tailEnd type="triangle"/>
-          </a:ln>
-        </p:spPr>
-        <p:style>
-          <a:lnRef idx="1">
-            <a:schemeClr val="accent1"/>
-          </a:lnRef>
-          <a:fillRef idx="0">
-            <a:schemeClr val="accent1"/>
-          </a:fillRef>
-          <a:effectRef idx="0">
-            <a:schemeClr val="accent1"/>
-          </a:effectRef>
-          <a:fontRef idx="minor">
-            <a:schemeClr val="tx1"/>
-          </a:fontRef>
-        </p:style>
-      </p:cxnSp>
-      <p:cxnSp>
-        <p:nvCxnSpPr>
-          <p:cNvPr id="49" name="Conector: Angulado 48">
-            <a:extLst>
-              <a:ext uri="{FF2B5EF4-FFF2-40B4-BE49-F238E27FC236}">
-                <a16:creationId xmlns:a16="http://schemas.microsoft.com/office/drawing/2014/main" id="{D3A06495-F2E6-4243-AF24-8B6B15BB2382}"/>
-              </a:ext>
-            </a:extLst>
-          </p:cNvPr>
-          <p:cNvCxnSpPr>
-            <a:cxnSpLocks/>
-            <a:endCxn id="41" idx="1"/>
-          </p:cNvCxnSpPr>
-          <p:nvPr/>
-        </p:nvCxnSpPr>
-        <p:spPr>
-          <a:xfrm>
-            <a:off x="9307824" y="2410662"/>
-            <a:ext cx="258628" cy="12700"/>
-          </a:xfrm>
-          <a:prstGeom prst="bentConnector3">
-            <a:avLst>
-              <a:gd name="adj1" fmla="val 50000"/>
-            </a:avLst>
-          </a:prstGeom>
-          <a:ln w="19050">
-            <a:solidFill>
-              <a:srgbClr val="FF0000"/>
-            </a:solidFill>
-            <a:tailEnd type="triangle"/>
-          </a:ln>
-        </p:spPr>
-        <p:style>
-          <a:lnRef idx="1">
-            <a:schemeClr val="accent1"/>
-          </a:lnRef>
-          <a:fillRef idx="0">
-            <a:schemeClr val="accent1"/>
-          </a:fillRef>
-          <a:effectRef idx="0">
-            <a:schemeClr val="accent1"/>
-          </a:effectRef>
-          <a:fontRef idx="minor">
-            <a:schemeClr val="tx1"/>
-          </a:fontRef>
-        </p:style>
-      </p:cxnSp>
-      <p:cxnSp>
-        <p:nvCxnSpPr>
-          <p:cNvPr id="52" name="Conector: Angulado 51">
-            <a:extLst>
-              <a:ext uri="{FF2B5EF4-FFF2-40B4-BE49-F238E27FC236}">
-                <a16:creationId xmlns:a16="http://schemas.microsoft.com/office/drawing/2014/main" id="{A4569BE9-F5A5-4D0B-ACB5-D1B61BF7D208}"/>
-              </a:ext>
-            </a:extLst>
-          </p:cNvPr>
-          <p:cNvCxnSpPr>
-            <a:cxnSpLocks/>
-            <a:endCxn id="42" idx="1"/>
-          </p:cNvCxnSpPr>
-          <p:nvPr/>
-        </p:nvCxnSpPr>
-        <p:spPr>
-          <a:xfrm>
-            <a:off x="10648718" y="2410662"/>
-            <a:ext cx="129314" cy="12700"/>
-          </a:xfrm>
-          <a:prstGeom prst="bentConnector3">
-            <a:avLst>
-              <a:gd name="adj1" fmla="val 50000"/>
-            </a:avLst>
-          </a:prstGeom>
-          <a:ln w="19050">
-            <a:solidFill>
-              <a:srgbClr val="FF0000"/>
-            </a:solidFill>
-            <a:tailEnd type="triangle"/>
-          </a:ln>
-        </p:spPr>
-        <p:style>
-          <a:lnRef idx="1">
-            <a:schemeClr val="accent1"/>
-          </a:lnRef>
-          <a:fillRef idx="0">
-            <a:schemeClr val="accent1"/>
-          </a:fillRef>
-          <a:effectRef idx="0">
-            <a:schemeClr val="accent1"/>
-          </a:effectRef>
-          <a:fontRef idx="minor">
-            <a:schemeClr val="tx1"/>
-          </a:fontRef>
-        </p:style>
-      </p:cxnSp>
       <p:sp>
         <p:nvSpPr>
           <p:cNvPr id="63" name="Retângulo 62">
@@ -4424,8 +4140,8 @@
         </p:nvSpPr>
         <p:spPr>
           <a:xfrm>
-            <a:off x="4061007" y="3119045"/>
-            <a:ext cx="1070111" cy="502520"/>
+            <a:off x="5690653" y="4638746"/>
+            <a:ext cx="1151055" cy="534105"/>
           </a:xfrm>
           <a:prstGeom prst="rect">
             <a:avLst/>
@@ -4433,15 +4149,15 @@
         </p:spPr>
         <p:style>
           <a:lnRef idx="2">
-            <a:schemeClr val="accent1">
+            <a:schemeClr val="accent2">
               <a:shade val="50000"/>
             </a:schemeClr>
           </a:lnRef>
           <a:fillRef idx="1">
-            <a:schemeClr val="accent1"/>
+            <a:schemeClr val="accent2"/>
           </a:fillRef>
           <a:effectRef idx="0">
-            <a:schemeClr val="accent1"/>
+            <a:schemeClr val="accent2"/>
           </a:effectRef>
           <a:fontRef idx="minor">
             <a:schemeClr val="lt1"/>
@@ -4464,53 +4180,6 @@
           </a:p>
         </p:txBody>
       </p:sp>
-      <p:cxnSp>
-        <p:nvCxnSpPr>
-          <p:cNvPr id="64" name="Conector: Angulado 63">
-            <a:extLst>
-              <a:ext uri="{FF2B5EF4-FFF2-40B4-BE49-F238E27FC236}">
-                <a16:creationId xmlns:a16="http://schemas.microsoft.com/office/drawing/2014/main" id="{3EEC02BA-9CA7-4062-B626-A52ADCE84BFC}"/>
-              </a:ext>
-            </a:extLst>
-          </p:cNvPr>
-          <p:cNvCxnSpPr>
-            <a:cxnSpLocks/>
-            <a:stCxn id="8" idx="2"/>
-          </p:cNvCxnSpPr>
-          <p:nvPr/>
-        </p:nvCxnSpPr>
-        <p:spPr>
-          <a:xfrm rot="16200000" flipH="1">
-            <a:off x="3010110" y="2331563"/>
-            <a:ext cx="1355014" cy="722470"/>
-          </a:xfrm>
-          <a:prstGeom prst="bentConnector3">
-            <a:avLst>
-              <a:gd name="adj1" fmla="val 99782"/>
-            </a:avLst>
-          </a:prstGeom>
-          <a:ln w="19050">
-            <a:solidFill>
-              <a:srgbClr val="FF0000"/>
-            </a:solidFill>
-            <a:tailEnd type="triangle"/>
-          </a:ln>
-        </p:spPr>
-        <p:style>
-          <a:lnRef idx="1">
-            <a:schemeClr val="accent1"/>
-          </a:lnRef>
-          <a:fillRef idx="0">
-            <a:schemeClr val="accent1"/>
-          </a:fillRef>
-          <a:effectRef idx="0">
-            <a:schemeClr val="accent1"/>
-          </a:effectRef>
-          <a:fontRef idx="minor">
-            <a:schemeClr val="tx1"/>
-          </a:fontRef>
-        </p:style>
-      </p:cxnSp>
       <p:sp>
         <p:nvSpPr>
           <p:cNvPr id="67" name="Retângulo 66">
@@ -4525,7 +4194,7 @@
         </p:nvSpPr>
         <p:spPr>
           <a:xfrm>
-            <a:off x="4061007" y="3853644"/>
+            <a:off x="2302433" y="3488351"/>
             <a:ext cx="1070111" cy="502520"/>
           </a:xfrm>
           <a:prstGeom prst="rect">
@@ -4534,15 +4203,15 @@
         </p:spPr>
         <p:style>
           <a:lnRef idx="2">
-            <a:schemeClr val="accent1">
+            <a:schemeClr val="accent2">
               <a:shade val="50000"/>
             </a:schemeClr>
           </a:lnRef>
           <a:fillRef idx="1">
-            <a:schemeClr val="accent1"/>
+            <a:schemeClr val="accent2"/>
           </a:fillRef>
           <a:effectRef idx="0">
-            <a:schemeClr val="accent1"/>
+            <a:schemeClr val="accent2"/>
           </a:effectRef>
           <a:fontRef idx="minor">
             <a:schemeClr val="lt1"/>
@@ -4565,53 +4234,6 @@
           </a:p>
         </p:txBody>
       </p:sp>
-      <p:cxnSp>
-        <p:nvCxnSpPr>
-          <p:cNvPr id="68" name="Conector: Angulado 67">
-            <a:extLst>
-              <a:ext uri="{FF2B5EF4-FFF2-40B4-BE49-F238E27FC236}">
-                <a16:creationId xmlns:a16="http://schemas.microsoft.com/office/drawing/2014/main" id="{120531A5-82D8-4EE9-A6AB-988D956E1222}"/>
-              </a:ext>
-            </a:extLst>
-          </p:cNvPr>
-          <p:cNvCxnSpPr>
-            <a:cxnSpLocks/>
-            <a:stCxn id="8" idx="2"/>
-          </p:cNvCxnSpPr>
-          <p:nvPr/>
-        </p:nvCxnSpPr>
-        <p:spPr>
-          <a:xfrm rot="16200000" flipH="1">
-            <a:off x="2642634" y="2699038"/>
-            <a:ext cx="2102120" cy="734625"/>
-          </a:xfrm>
-          <a:prstGeom prst="bentConnector3">
-            <a:avLst>
-              <a:gd name="adj1" fmla="val 99917"/>
-            </a:avLst>
-          </a:prstGeom>
-          <a:ln w="19050">
-            <a:solidFill>
-              <a:srgbClr val="FF0000"/>
-            </a:solidFill>
-            <a:tailEnd type="triangle"/>
-          </a:ln>
-        </p:spPr>
-        <p:style>
-          <a:lnRef idx="1">
-            <a:schemeClr val="accent1"/>
-          </a:lnRef>
-          <a:fillRef idx="0">
-            <a:schemeClr val="accent1"/>
-          </a:fillRef>
-          <a:effectRef idx="0">
-            <a:schemeClr val="accent1"/>
-          </a:effectRef>
-          <a:fontRef idx="minor">
-            <a:schemeClr val="tx1"/>
-          </a:fontRef>
-        </p:style>
-      </p:cxnSp>
       <p:sp>
         <p:nvSpPr>
           <p:cNvPr id="71" name="Retângulo 70">
@@ -4626,7 +4248,7 @@
         </p:nvSpPr>
         <p:spPr>
           <a:xfrm>
-            <a:off x="4061007" y="4700588"/>
+            <a:off x="2302432" y="5158405"/>
             <a:ext cx="1070111" cy="502520"/>
           </a:xfrm>
           <a:prstGeom prst="rect">
@@ -4635,15 +4257,15 @@
         </p:spPr>
         <p:style>
           <a:lnRef idx="2">
-            <a:schemeClr val="accent1">
+            <a:schemeClr val="accent2">
               <a:shade val="50000"/>
             </a:schemeClr>
           </a:lnRef>
           <a:fillRef idx="1">
-            <a:schemeClr val="accent1"/>
+            <a:schemeClr val="accent2"/>
           </a:fillRef>
           <a:effectRef idx="0">
-            <a:schemeClr val="accent1"/>
+            <a:schemeClr val="accent2"/>
           </a:effectRef>
           <a:fontRef idx="minor">
             <a:schemeClr val="lt1"/>
@@ -4660,58 +4282,22 @@
                   <a:schemeClr val="bg1"/>
                 </a:solidFill>
               </a:rPr>
-              <a:t>Pedidos Realizados</a:t>
-            </a:r>
-          </a:p>
-        </p:txBody>
-      </p:sp>
-      <p:cxnSp>
-        <p:nvCxnSpPr>
-          <p:cNvPr id="72" name="Conector: Angulado 71">
-            <a:extLst>
-              <a:ext uri="{FF2B5EF4-FFF2-40B4-BE49-F238E27FC236}">
-                <a16:creationId xmlns:a16="http://schemas.microsoft.com/office/drawing/2014/main" id="{87916041-8BAD-4DAE-B97E-CB86A21E60B6}"/>
-              </a:ext>
-            </a:extLst>
-          </p:cNvPr>
-          <p:cNvCxnSpPr>
-            <a:cxnSpLocks/>
-            <a:stCxn id="8" idx="2"/>
-          </p:cNvCxnSpPr>
-          <p:nvPr/>
-        </p:nvCxnSpPr>
-        <p:spPr>
-          <a:xfrm rot="16200000" flipH="1">
-            <a:off x="2218514" y="3123159"/>
-            <a:ext cx="2936558" cy="720822"/>
-          </a:xfrm>
-          <a:prstGeom prst="bentConnector3">
-            <a:avLst>
-              <a:gd name="adj1" fmla="val 100026"/>
-            </a:avLst>
-          </a:prstGeom>
-          <a:ln w="19050">
-            <a:solidFill>
-              <a:srgbClr val="FF0000"/>
-            </a:solidFill>
-            <a:tailEnd type="triangle"/>
-          </a:ln>
-        </p:spPr>
-        <p:style>
-          <a:lnRef idx="1">
-            <a:schemeClr val="accent1"/>
-          </a:lnRef>
-          <a:fillRef idx="0">
-            <a:schemeClr val="accent1"/>
-          </a:fillRef>
-          <a:effectRef idx="0">
-            <a:schemeClr val="accent1"/>
-          </a:effectRef>
-          <a:fontRef idx="minor">
-            <a:schemeClr val="tx1"/>
-          </a:fontRef>
-        </p:style>
-      </p:cxnSp>
+              <a:t>Histórico de </a:t>
+            </a:r>
+          </a:p>
+          <a:p>
+            <a:pPr algn="ctr"/>
+            <a:r>
+              <a:rPr lang="pt-BR" sz="1200" dirty="0">
+                <a:solidFill>
+                  <a:schemeClr val="bg1"/>
+                </a:solidFill>
+              </a:rPr>
+              <a:t>Pedidos</a:t>
+            </a:r>
+          </a:p>
+        </p:txBody>
+      </p:sp>
       <p:sp>
         <p:nvSpPr>
           <p:cNvPr id="75" name="Retângulo 74">
@@ -4726,7 +4312,7 @@
         </p:nvSpPr>
         <p:spPr>
           <a:xfrm>
-            <a:off x="4061007" y="5484928"/>
+            <a:off x="4075069" y="3966491"/>
             <a:ext cx="1070111" cy="502520"/>
           </a:xfrm>
           <a:prstGeom prst="rect">
@@ -4735,15 +4321,15 @@
         </p:spPr>
         <p:style>
           <a:lnRef idx="2">
-            <a:schemeClr val="accent1">
+            <a:schemeClr val="accent2">
               <a:shade val="50000"/>
             </a:schemeClr>
           </a:lnRef>
           <a:fillRef idx="1">
-            <a:schemeClr val="accent1"/>
+            <a:schemeClr val="accent2"/>
           </a:fillRef>
           <a:effectRef idx="0">
-            <a:schemeClr val="accent1"/>
+            <a:schemeClr val="accent2"/>
           </a:effectRef>
           <a:fontRef idx="minor">
             <a:schemeClr val="lt1"/>
@@ -4783,28 +4369,25 @@
         </p:nvCxnSpPr>
         <p:spPr>
           <a:xfrm rot="16200000" flipH="1">
-            <a:off x="1833246" y="3508426"/>
-            <a:ext cx="3720897" cy="734625"/>
+            <a:off x="2773670" y="2916352"/>
+            <a:ext cx="2043008" cy="559790"/>
           </a:xfrm>
           <a:prstGeom prst="bentConnector2">
             <a:avLst/>
           </a:prstGeom>
-          <a:ln w="19050">
-            <a:solidFill>
-              <a:srgbClr val="FF0000"/>
-            </a:solidFill>
+          <a:ln>
             <a:tailEnd type="triangle"/>
           </a:ln>
         </p:spPr>
         <p:style>
-          <a:lnRef idx="1">
-            <a:schemeClr val="accent1"/>
+          <a:lnRef idx="3">
+            <a:schemeClr val="accent4"/>
           </a:lnRef>
           <a:fillRef idx="0">
-            <a:schemeClr val="accent1"/>
+            <a:schemeClr val="accent4"/>
           </a:fillRef>
-          <a:effectRef idx="0">
-            <a:schemeClr val="accent1"/>
+          <a:effectRef idx="2">
+            <a:schemeClr val="accent4"/>
           </a:effectRef>
           <a:fontRef idx="minor">
             <a:schemeClr val="tx1"/>
@@ -4825,7 +4408,7 @@
         </p:nvSpPr>
         <p:spPr>
           <a:xfrm>
-            <a:off x="6096000" y="3853644"/>
+            <a:off x="640758" y="3791651"/>
             <a:ext cx="1354111" cy="893033"/>
           </a:xfrm>
           <a:prstGeom prst="rect">
@@ -4834,15 +4417,15 @@
         </p:spPr>
         <p:style>
           <a:lnRef idx="2">
-            <a:schemeClr val="accent1">
+            <a:schemeClr val="accent2">
               <a:shade val="50000"/>
             </a:schemeClr>
           </a:lnRef>
           <a:fillRef idx="1">
-            <a:schemeClr val="accent1"/>
+            <a:schemeClr val="accent2"/>
           </a:fillRef>
           <a:effectRef idx="0">
-            <a:schemeClr val="accent1"/>
+            <a:schemeClr val="accent2"/>
           </a:effectRef>
           <a:fontRef idx="minor">
             <a:schemeClr val="lt1"/>
@@ -4888,16 +4471,6 @@
                   <a:schemeClr val="bg1"/>
                 </a:solidFill>
               </a:rPr>
-              <a:t>Alterar nome</a:t>
-            </a:r>
-          </a:p>
-          <a:p>
-            <a:r>
-              <a:rPr lang="pt-BR" sz="1200" dirty="0">
-                <a:solidFill>
-                  <a:schemeClr val="bg1"/>
-                </a:solidFill>
-              </a:rPr>
               <a:t>Sair(Logout)</a:t>
             </a:r>
           </a:p>
@@ -4914,37 +4487,34 @@
           </p:cNvPr>
           <p:cNvCxnSpPr>
             <a:cxnSpLocks/>
-            <a:stCxn id="67" idx="3"/>
-            <a:endCxn id="79" idx="1"/>
+            <a:stCxn id="67" idx="1"/>
+            <a:endCxn id="79" idx="3"/>
           </p:cNvCxnSpPr>
           <p:nvPr/>
         </p:nvCxnSpPr>
         <p:spPr>
-          <a:xfrm>
-            <a:off x="5131118" y="4104904"/>
-            <a:ext cx="964882" cy="195257"/>
+          <a:xfrm rot="10800000" flipV="1">
+            <a:off x="1994869" y="3739610"/>
+            <a:ext cx="307564" cy="498557"/>
           </a:xfrm>
           <a:prstGeom prst="bentConnector3">
             <a:avLst>
               <a:gd name="adj1" fmla="val 50000"/>
             </a:avLst>
           </a:prstGeom>
-          <a:ln w="19050">
-            <a:solidFill>
-              <a:srgbClr val="FF0000"/>
-            </a:solidFill>
+          <a:ln>
             <a:tailEnd type="triangle"/>
           </a:ln>
         </p:spPr>
         <p:style>
-          <a:lnRef idx="1">
-            <a:schemeClr val="accent1"/>
+          <a:lnRef idx="3">
+            <a:schemeClr val="accent4"/>
           </a:lnRef>
           <a:fillRef idx="0">
-            <a:schemeClr val="accent1"/>
+            <a:schemeClr val="accent4"/>
           </a:fillRef>
-          <a:effectRef idx="0">
-            <a:schemeClr val="accent1"/>
+          <a:effectRef idx="2">
+            <a:schemeClr val="accent4"/>
           </a:effectRef>
           <a:fontRef idx="minor">
             <a:schemeClr val="tx1"/>
@@ -4973,14 +4543,16 @@
           </a:prstGeom>
         </p:spPr>
         <p:style>
-          <a:lnRef idx="1">
-            <a:schemeClr val="accent2"/>
+          <a:lnRef idx="2">
+            <a:schemeClr val="accent4">
+              <a:shade val="50000"/>
+            </a:schemeClr>
           </a:lnRef>
-          <a:fillRef idx="3">
-            <a:schemeClr val="accent2"/>
+          <a:fillRef idx="1">
+            <a:schemeClr val="accent4"/>
           </a:fillRef>
-          <a:effectRef idx="2">
-            <a:schemeClr val="accent2"/>
+          <a:effectRef idx="0">
+            <a:schemeClr val="accent4"/>
           </a:effectRef>
           <a:fontRef idx="minor">
             <a:schemeClr val="lt1"/>
@@ -4992,14 +4564,13 @@
           <a:p>
             <a:pPr algn="ctr"/>
             <a:r>
-              <a:rPr lang="pt-BR" sz="1200" dirty="0"/>
+              <a:rPr lang="pt-BR" sz="1200" b="1" dirty="0">
+                <a:solidFill>
+                  <a:schemeClr val="tx1"/>
+                </a:solidFill>
+              </a:rPr>
               <a:t>Política e Termos</a:t>
             </a:r>
-            <a:endParaRPr lang="pt-BR" sz="1200" dirty="0">
-              <a:solidFill>
-                <a:srgbClr val="FFFF00"/>
-              </a:solidFill>
-            </a:endParaRPr>
           </a:p>
         </p:txBody>
       </p:sp>
@@ -5013,18 +4584,21 @@
             </a:extLst>
           </p:cNvPr>
           <p:cNvCxnSpPr>
-            <a:stCxn id="9" idx="2"/>
+            <a:cxnSpLocks/>
+            <a:stCxn id="67" idx="0"/>
             <a:endCxn id="84" idx="0"/>
           </p:cNvCxnSpPr>
           <p:nvPr/>
         </p:nvCxnSpPr>
         <p:spPr>
-          <a:xfrm rot="5400000">
-            <a:off x="994712" y="2792080"/>
-            <a:ext cx="548539" cy="1"/>
+          <a:xfrm rot="16200000" flipV="1">
+            <a:off x="1842235" y="2493096"/>
+            <a:ext cx="422001" cy="1568509"/>
           </a:xfrm>
           <a:prstGeom prst="bentConnector3">
-            <a:avLst/>
+            <a:avLst>
+              <a:gd name="adj1" fmla="val 154170"/>
+            </a:avLst>
           </a:prstGeom>
           <a:ln>
             <a:headEnd type="triangle"/>
@@ -5046,45 +4620,709 @@
           </a:fontRef>
         </p:style>
       </p:cxnSp>
+      <p:sp>
+        <p:nvSpPr>
+          <p:cNvPr id="2" name="Elipse 1">
+            <a:extLst>
+              <a:ext uri="{FF2B5EF4-FFF2-40B4-BE49-F238E27FC236}">
+                <a16:creationId xmlns:a16="http://schemas.microsoft.com/office/drawing/2014/main" id="{F8A9EC08-9453-442F-8A10-D240E1702607}"/>
+              </a:ext>
+            </a:extLst>
+          </p:cNvPr>
+          <p:cNvSpPr/>
+          <p:nvPr/>
+        </p:nvSpPr>
+        <p:spPr>
+          <a:xfrm>
+            <a:off x="3135031" y="102398"/>
+            <a:ext cx="1880075" cy="825675"/>
+          </a:xfrm>
+          <a:prstGeom prst="ellipse">
+            <a:avLst/>
+          </a:prstGeom>
+        </p:spPr>
+        <p:style>
+          <a:lnRef idx="2">
+            <a:schemeClr val="accent2">
+              <a:shade val="50000"/>
+            </a:schemeClr>
+          </a:lnRef>
+          <a:fillRef idx="1">
+            <a:schemeClr val="accent2"/>
+          </a:fillRef>
+          <a:effectRef idx="0">
+            <a:schemeClr val="accent2"/>
+          </a:effectRef>
+          <a:fontRef idx="minor">
+            <a:schemeClr val="lt1"/>
+          </a:fontRef>
+        </p:style>
+        <p:txBody>
+          <a:bodyPr rtlCol="0" anchor="ctr"/>
+          <a:lstStyle/>
+          <a:p>
+            <a:pPr algn="ctr"/>
+            <a:r>
+              <a:rPr lang="pt-BR" sz="1600" dirty="0"/>
+              <a:t>Apresentação</a:t>
+            </a:r>
+          </a:p>
+        </p:txBody>
+      </p:sp>
       <p:cxnSp>
         <p:nvCxnSpPr>
-          <p:cNvPr id="88" name="Conector: Angulado 87">
-            <a:extLst>
-              <a:ext uri="{FF2B5EF4-FFF2-40B4-BE49-F238E27FC236}">
-                <a16:creationId xmlns:a16="http://schemas.microsoft.com/office/drawing/2014/main" id="{98831896-7ACB-4BBE-A6AD-A61A92337CC1}"/>
+          <p:cNvPr id="95" name="Conector: Angulado 94">
+            <a:extLst>
+              <a:ext uri="{FF2B5EF4-FFF2-40B4-BE49-F238E27FC236}">
+                <a16:creationId xmlns:a16="http://schemas.microsoft.com/office/drawing/2014/main" id="{8663B7A9-DFEC-4CFA-A2A6-291EF629F724}"/>
               </a:ext>
             </a:extLst>
           </p:cNvPr>
           <p:cNvCxnSpPr>
             <a:cxnSpLocks/>
+            <a:stCxn id="8" idx="2"/>
+            <a:endCxn id="67" idx="3"/>
+          </p:cNvCxnSpPr>
+          <p:nvPr/>
+        </p:nvCxnSpPr>
+        <p:spPr>
+          <a:xfrm rot="5400000">
+            <a:off x="2661478" y="2885810"/>
+            <a:ext cx="1564868" cy="142735"/>
+          </a:xfrm>
+          <a:prstGeom prst="bentConnector2">
+            <a:avLst/>
+          </a:prstGeom>
+          <a:ln>
+            <a:tailEnd type="triangle"/>
+          </a:ln>
+        </p:spPr>
+        <p:style>
+          <a:lnRef idx="3">
+            <a:schemeClr val="accent4"/>
+          </a:lnRef>
+          <a:fillRef idx="0">
+            <a:schemeClr val="accent4"/>
+          </a:fillRef>
+          <a:effectRef idx="2">
+            <a:schemeClr val="accent4"/>
+          </a:effectRef>
+          <a:fontRef idx="minor">
+            <a:schemeClr val="tx1"/>
+          </a:fontRef>
+        </p:style>
+      </p:cxnSp>
+      <p:cxnSp>
+        <p:nvCxnSpPr>
+          <p:cNvPr id="112" name="Conector: Angulado 111">
+            <a:extLst>
+              <a:ext uri="{FF2B5EF4-FFF2-40B4-BE49-F238E27FC236}">
+                <a16:creationId xmlns:a16="http://schemas.microsoft.com/office/drawing/2014/main" id="{2192D7B0-A1E4-4219-BFC0-A8D16C0D3904}"/>
+              </a:ext>
+            </a:extLst>
+          </p:cNvPr>
+          <p:cNvCxnSpPr>
+            <a:cxnSpLocks/>
+          </p:cNvCxnSpPr>
+          <p:nvPr/>
+        </p:nvCxnSpPr>
+        <p:spPr>
+          <a:xfrm flipV="1">
+            <a:off x="8122548" y="3344819"/>
+            <a:ext cx="547542" cy="1"/>
+          </a:xfrm>
+          <a:prstGeom prst="bentConnector3">
+            <a:avLst>
+              <a:gd name="adj1" fmla="val 50000"/>
+            </a:avLst>
+          </a:prstGeom>
+          <a:ln>
+            <a:tailEnd type="triangle"/>
+          </a:ln>
+        </p:spPr>
+        <p:style>
+          <a:lnRef idx="3">
+            <a:schemeClr val="accent4"/>
+          </a:lnRef>
+          <a:fillRef idx="0">
+            <a:schemeClr val="accent4"/>
+          </a:fillRef>
+          <a:effectRef idx="2">
+            <a:schemeClr val="accent4"/>
+          </a:effectRef>
+          <a:fontRef idx="minor">
+            <a:schemeClr val="tx1"/>
+          </a:fontRef>
+        </p:style>
+      </p:cxnSp>
+      <p:cxnSp>
+        <p:nvCxnSpPr>
+          <p:cNvPr id="146" name="Conector de Seta Reta 145">
+            <a:extLst>
+              <a:ext uri="{FF2B5EF4-FFF2-40B4-BE49-F238E27FC236}">
+                <a16:creationId xmlns:a16="http://schemas.microsoft.com/office/drawing/2014/main" id="{D315CB4C-37A2-466D-B0F9-7D95C60680EA}"/>
+              </a:ext>
+            </a:extLst>
+          </p:cNvPr>
+          <p:cNvCxnSpPr>
+            <a:cxnSpLocks/>
+            <a:stCxn id="67" idx="2"/>
+            <a:endCxn id="71" idx="0"/>
+          </p:cNvCxnSpPr>
+          <p:nvPr/>
+        </p:nvCxnSpPr>
+        <p:spPr>
+          <a:xfrm flipH="1">
+            <a:off x="2837488" y="3990871"/>
+            <a:ext cx="1" cy="1167534"/>
+          </a:xfrm>
+          <a:prstGeom prst="straightConnector1">
+            <a:avLst/>
+          </a:prstGeom>
+          <a:ln>
+            <a:tailEnd type="triangle"/>
+          </a:ln>
+        </p:spPr>
+        <p:style>
+          <a:lnRef idx="3">
+            <a:schemeClr val="accent4"/>
+          </a:lnRef>
+          <a:fillRef idx="0">
+            <a:schemeClr val="accent4"/>
+          </a:fillRef>
+          <a:effectRef idx="2">
+            <a:schemeClr val="accent4"/>
+          </a:effectRef>
+          <a:fontRef idx="minor">
+            <a:schemeClr val="tx1"/>
+          </a:fontRef>
+        </p:style>
+      </p:cxnSp>
+      <p:sp>
+        <p:nvSpPr>
+          <p:cNvPr id="162" name="Retângulo 161">
+            <a:extLst>
+              <a:ext uri="{FF2B5EF4-FFF2-40B4-BE49-F238E27FC236}">
+                <a16:creationId xmlns:a16="http://schemas.microsoft.com/office/drawing/2014/main" id="{BA7C0EAD-FD71-4203-AD17-F8244E837456}"/>
+              </a:ext>
+            </a:extLst>
+          </p:cNvPr>
+          <p:cNvSpPr/>
+          <p:nvPr/>
+        </p:nvSpPr>
+        <p:spPr>
+          <a:xfrm>
+            <a:off x="4044604" y="3042976"/>
+            <a:ext cx="1070111" cy="502520"/>
+          </a:xfrm>
+          <a:prstGeom prst="rect">
+            <a:avLst/>
+          </a:prstGeom>
+        </p:spPr>
+        <p:style>
+          <a:lnRef idx="2">
+            <a:schemeClr val="accent2">
+              <a:shade val="50000"/>
+            </a:schemeClr>
+          </a:lnRef>
+          <a:fillRef idx="1">
+            <a:schemeClr val="accent2"/>
+          </a:fillRef>
+          <a:effectRef idx="0">
+            <a:schemeClr val="accent2"/>
+          </a:effectRef>
+          <a:fontRef idx="minor">
+            <a:schemeClr val="lt1"/>
+          </a:fontRef>
+        </p:style>
+        <p:txBody>
+          <a:bodyPr rtlCol="0" anchor="ctr"/>
+          <a:lstStyle/>
+          <a:p>
+            <a:pPr algn="ctr"/>
+            <a:r>
+              <a:rPr lang="pt-BR" sz="1200" dirty="0">
+                <a:solidFill>
+                  <a:schemeClr val="bg1"/>
+                </a:solidFill>
+              </a:rPr>
+              <a:t>Favoritos</a:t>
+            </a:r>
+          </a:p>
+        </p:txBody>
+      </p:sp>
+      <p:cxnSp>
+        <p:nvCxnSpPr>
+          <p:cNvPr id="194" name="Conector: Angulado 193">
+            <a:extLst>
+              <a:ext uri="{FF2B5EF4-FFF2-40B4-BE49-F238E27FC236}">
+                <a16:creationId xmlns:a16="http://schemas.microsoft.com/office/drawing/2014/main" id="{65CD8003-ABE1-4D91-916E-8F093190E3CB}"/>
+              </a:ext>
+            </a:extLst>
+          </p:cNvPr>
+          <p:cNvCxnSpPr>
+            <a:cxnSpLocks/>
+            <a:stCxn id="162" idx="3"/>
+            <a:endCxn id="39" idx="1"/>
+          </p:cNvCxnSpPr>
+          <p:nvPr/>
+        </p:nvCxnSpPr>
+        <p:spPr>
+          <a:xfrm>
+            <a:off x="5114715" y="3294236"/>
+            <a:ext cx="336888" cy="44210"/>
+          </a:xfrm>
+          <a:prstGeom prst="bentConnector3">
+            <a:avLst>
+              <a:gd name="adj1" fmla="val 50000"/>
+            </a:avLst>
+          </a:prstGeom>
+          <a:ln>
+            <a:tailEnd type="triangle"/>
+          </a:ln>
+        </p:spPr>
+        <p:style>
+          <a:lnRef idx="3">
+            <a:schemeClr val="accent4"/>
+          </a:lnRef>
+          <a:fillRef idx="0">
+            <a:schemeClr val="accent4"/>
+          </a:fillRef>
+          <a:effectRef idx="2">
+            <a:schemeClr val="accent4"/>
+          </a:effectRef>
+          <a:fontRef idx="minor">
+            <a:schemeClr val="tx1"/>
+          </a:fontRef>
+        </p:style>
+      </p:cxnSp>
+      <p:cxnSp>
+        <p:nvCxnSpPr>
+          <p:cNvPr id="204" name="Conector: Angulado 203">
+            <a:extLst>
+              <a:ext uri="{FF2B5EF4-FFF2-40B4-BE49-F238E27FC236}">
+                <a16:creationId xmlns:a16="http://schemas.microsoft.com/office/drawing/2014/main" id="{9612C6FB-C1F1-4857-A7A0-517568A525E0}"/>
+              </a:ext>
+            </a:extLst>
+          </p:cNvPr>
+          <p:cNvCxnSpPr>
+            <a:cxnSpLocks/>
+            <a:stCxn id="71" idx="3"/>
+            <a:endCxn id="63" idx="2"/>
+          </p:cNvCxnSpPr>
+          <p:nvPr/>
+        </p:nvCxnSpPr>
+        <p:spPr>
+          <a:xfrm flipV="1">
+            <a:off x="3372543" y="5172851"/>
+            <a:ext cx="2893638" cy="236814"/>
+          </a:xfrm>
+          <a:prstGeom prst="bentConnector2">
+            <a:avLst/>
+          </a:prstGeom>
+          <a:ln>
+            <a:tailEnd type="triangle"/>
+          </a:ln>
+        </p:spPr>
+        <p:style>
+          <a:lnRef idx="3">
+            <a:schemeClr val="accent4"/>
+          </a:lnRef>
+          <a:fillRef idx="0">
+            <a:schemeClr val="accent4"/>
+          </a:fillRef>
+          <a:effectRef idx="2">
+            <a:schemeClr val="accent4"/>
+          </a:effectRef>
+          <a:fontRef idx="minor">
+            <a:schemeClr val="tx1"/>
+          </a:fontRef>
+        </p:style>
+      </p:cxnSp>
+      <p:cxnSp>
+        <p:nvCxnSpPr>
+          <p:cNvPr id="206" name="Conector: Angulado 205">
+            <a:extLst>
+              <a:ext uri="{FF2B5EF4-FFF2-40B4-BE49-F238E27FC236}">
+                <a16:creationId xmlns:a16="http://schemas.microsoft.com/office/drawing/2014/main" id="{7636BEBC-8C94-47FF-8FE2-F1D113E37125}"/>
+              </a:ext>
+            </a:extLst>
+          </p:cNvPr>
+          <p:cNvCxnSpPr>
+            <a:cxnSpLocks/>
+            <a:stCxn id="8" idx="2"/>
+            <a:endCxn id="162" idx="1"/>
+          </p:cNvCxnSpPr>
+          <p:nvPr/>
+        </p:nvCxnSpPr>
+        <p:spPr>
+          <a:xfrm rot="16200000" flipH="1">
+            <a:off x="3220195" y="2469826"/>
+            <a:ext cx="1119493" cy="529325"/>
+          </a:xfrm>
+          <a:prstGeom prst="bentConnector2">
+            <a:avLst/>
+          </a:prstGeom>
+          <a:ln>
+            <a:tailEnd type="triangle"/>
+          </a:ln>
+        </p:spPr>
+        <p:style>
+          <a:lnRef idx="3">
+            <a:schemeClr val="accent4"/>
+          </a:lnRef>
+          <a:fillRef idx="0">
+            <a:schemeClr val="accent4"/>
+          </a:fillRef>
+          <a:effectRef idx="2">
+            <a:schemeClr val="accent4"/>
+          </a:effectRef>
+          <a:fontRef idx="minor">
+            <a:schemeClr val="tx1"/>
+          </a:fontRef>
+        </p:style>
+      </p:cxnSp>
+      <p:cxnSp>
+        <p:nvCxnSpPr>
+          <p:cNvPr id="212" name="Conector de Seta Reta 211">
+            <a:extLst>
+              <a:ext uri="{FF2B5EF4-FFF2-40B4-BE49-F238E27FC236}">
+                <a16:creationId xmlns:a16="http://schemas.microsoft.com/office/drawing/2014/main" id="{EFC30D90-8FAF-4149-8D13-FD51CB061326}"/>
+              </a:ext>
+            </a:extLst>
+          </p:cNvPr>
+          <p:cNvCxnSpPr>
+            <a:cxnSpLocks/>
+            <a:stCxn id="33" idx="2"/>
+            <a:endCxn id="39" idx="0"/>
+          </p:cNvCxnSpPr>
+          <p:nvPr/>
+        </p:nvCxnSpPr>
+        <p:spPr>
+          <a:xfrm flipH="1">
+            <a:off x="5986659" y="2577617"/>
+            <a:ext cx="998" cy="509569"/>
+          </a:xfrm>
+          <a:prstGeom prst="straightConnector1">
+            <a:avLst/>
+          </a:prstGeom>
+          <a:ln>
+            <a:tailEnd type="triangle"/>
+          </a:ln>
+        </p:spPr>
+        <p:style>
+          <a:lnRef idx="3">
+            <a:schemeClr val="accent4"/>
+          </a:lnRef>
+          <a:fillRef idx="0">
+            <a:schemeClr val="accent4"/>
+          </a:fillRef>
+          <a:effectRef idx="2">
+            <a:schemeClr val="accent4"/>
+          </a:effectRef>
+          <a:fontRef idx="minor">
+            <a:schemeClr val="tx1"/>
+          </a:fontRef>
+        </p:style>
+      </p:cxnSp>
+      <p:cxnSp>
+        <p:nvCxnSpPr>
+          <p:cNvPr id="217" name="Conector: Angulado 216">
+            <a:extLst>
+              <a:ext uri="{FF2B5EF4-FFF2-40B4-BE49-F238E27FC236}">
+                <a16:creationId xmlns:a16="http://schemas.microsoft.com/office/drawing/2014/main" id="{D6FD97AD-8E6E-4C9F-A050-15CF94DA2245}"/>
+              </a:ext>
+            </a:extLst>
+          </p:cNvPr>
+          <p:cNvCxnSpPr>
+            <a:cxnSpLocks/>
+            <a:stCxn id="75" idx="3"/>
             <a:endCxn id="40" idx="2"/>
           </p:cNvCxnSpPr>
           <p:nvPr/>
         </p:nvCxnSpPr>
         <p:spPr>
           <a:xfrm flipV="1">
-            <a:off x="5125200" y="2674622"/>
-            <a:ext cx="3638047" cy="3076756"/>
+            <a:off x="5145180" y="3596079"/>
+            <a:ext cx="2442313" cy="621672"/>
           </a:xfrm>
           <a:prstGeom prst="bentConnector2">
             <a:avLst/>
           </a:prstGeom>
-          <a:ln w="19050">
-            <a:solidFill>
-              <a:srgbClr val="FF0000"/>
-            </a:solidFill>
+          <a:ln>
             <a:tailEnd type="triangle"/>
           </a:ln>
         </p:spPr>
         <p:style>
-          <a:lnRef idx="1">
-            <a:schemeClr val="accent1"/>
+          <a:lnRef idx="3">
+            <a:schemeClr val="accent5"/>
           </a:lnRef>
           <a:fillRef idx="0">
-            <a:schemeClr val="accent1"/>
+            <a:schemeClr val="accent5"/>
           </a:fillRef>
-          <a:effectRef idx="0">
-            <a:schemeClr val="accent1"/>
+          <a:effectRef idx="2">
+            <a:schemeClr val="accent5"/>
+          </a:effectRef>
+          <a:fontRef idx="minor">
+            <a:schemeClr val="tx1"/>
+          </a:fontRef>
+        </p:style>
+      </p:cxnSp>
+      <p:cxnSp>
+        <p:nvCxnSpPr>
+          <p:cNvPr id="240" name="Conector: Angulado 239">
+            <a:extLst>
+              <a:ext uri="{FF2B5EF4-FFF2-40B4-BE49-F238E27FC236}">
+                <a16:creationId xmlns:a16="http://schemas.microsoft.com/office/drawing/2014/main" id="{1F4575D7-7F78-4938-9E19-9867BFC41BEE}"/>
+              </a:ext>
+            </a:extLst>
+          </p:cNvPr>
+          <p:cNvCxnSpPr>
+            <a:cxnSpLocks/>
+            <a:stCxn id="75" idx="2"/>
+            <a:endCxn id="63" idx="1"/>
+          </p:cNvCxnSpPr>
+          <p:nvPr/>
+        </p:nvCxnSpPr>
+        <p:spPr>
+          <a:xfrm rot="16200000" flipH="1">
+            <a:off x="4931995" y="4147141"/>
+            <a:ext cx="436788" cy="1080528"/>
+          </a:xfrm>
+          <a:prstGeom prst="bentConnector2">
+            <a:avLst/>
+          </a:prstGeom>
+          <a:ln>
+            <a:tailEnd type="triangle"/>
+          </a:ln>
+        </p:spPr>
+        <p:style>
+          <a:lnRef idx="3">
+            <a:schemeClr val="accent5"/>
+          </a:lnRef>
+          <a:fillRef idx="0">
+            <a:schemeClr val="accent5"/>
+          </a:fillRef>
+          <a:effectRef idx="2">
+            <a:schemeClr val="accent5"/>
+          </a:effectRef>
+          <a:fontRef idx="minor">
+            <a:schemeClr val="tx1"/>
+          </a:fontRef>
+        </p:style>
+      </p:cxnSp>
+      <p:cxnSp>
+        <p:nvCxnSpPr>
+          <p:cNvPr id="248" name="Conector de Seta Reta 247">
+            <a:extLst>
+              <a:ext uri="{FF2B5EF4-FFF2-40B4-BE49-F238E27FC236}">
+                <a16:creationId xmlns:a16="http://schemas.microsoft.com/office/drawing/2014/main" id="{8BE2D80A-1456-4C8F-8E4F-E7B30CA3180F}"/>
+              </a:ext>
+            </a:extLst>
+          </p:cNvPr>
+          <p:cNvCxnSpPr>
+            <a:cxnSpLocks/>
+            <a:stCxn id="41" idx="0"/>
+            <a:endCxn id="42" idx="2"/>
+          </p:cNvCxnSpPr>
+          <p:nvPr/>
+        </p:nvCxnSpPr>
+        <p:spPr>
+          <a:xfrm flipH="1" flipV="1">
+            <a:off x="9188326" y="2677261"/>
+            <a:ext cx="1" cy="409925"/>
+          </a:xfrm>
+          <a:prstGeom prst="straightConnector1">
+            <a:avLst/>
+          </a:prstGeom>
+          <a:ln>
+            <a:tailEnd type="triangle"/>
+          </a:ln>
+        </p:spPr>
+        <p:style>
+          <a:lnRef idx="3">
+            <a:schemeClr val="accent4"/>
+          </a:lnRef>
+          <a:fillRef idx="0">
+            <a:schemeClr val="accent4"/>
+          </a:fillRef>
+          <a:effectRef idx="2">
+            <a:schemeClr val="accent4"/>
+          </a:effectRef>
+          <a:fontRef idx="minor">
+            <a:schemeClr val="tx1"/>
+          </a:fontRef>
+        </p:style>
+      </p:cxnSp>
+      <p:cxnSp>
+        <p:nvCxnSpPr>
+          <p:cNvPr id="252" name="Conector: Angulado 251">
+            <a:extLst>
+              <a:ext uri="{FF2B5EF4-FFF2-40B4-BE49-F238E27FC236}">
+                <a16:creationId xmlns:a16="http://schemas.microsoft.com/office/drawing/2014/main" id="{BC0D238E-FBE0-4FC3-A0A7-9EB81444E966}"/>
+              </a:ext>
+            </a:extLst>
+          </p:cNvPr>
+          <p:cNvCxnSpPr>
+            <a:cxnSpLocks/>
+            <a:stCxn id="41" idx="2"/>
+            <a:endCxn id="63" idx="3"/>
+          </p:cNvCxnSpPr>
+          <p:nvPr/>
+        </p:nvCxnSpPr>
+        <p:spPr>
+          <a:xfrm rot="5400000">
+            <a:off x="7356972" y="3074443"/>
+            <a:ext cx="1316093" cy="2346619"/>
+          </a:xfrm>
+          <a:prstGeom prst="bentConnector2">
+            <a:avLst/>
+          </a:prstGeom>
+          <a:ln>
+            <a:tailEnd type="triangle"/>
+          </a:ln>
+        </p:spPr>
+        <p:style>
+          <a:lnRef idx="3">
+            <a:schemeClr val="accent5"/>
+          </a:lnRef>
+          <a:fillRef idx="0">
+            <a:schemeClr val="accent5"/>
+          </a:fillRef>
+          <a:effectRef idx="2">
+            <a:schemeClr val="accent5"/>
+          </a:effectRef>
+          <a:fontRef idx="minor">
+            <a:schemeClr val="tx1"/>
+          </a:fontRef>
+        </p:style>
+      </p:cxnSp>
+      <p:cxnSp>
+        <p:nvCxnSpPr>
+          <p:cNvPr id="258" name="Conector: Angulado 257">
+            <a:extLst>
+              <a:ext uri="{FF2B5EF4-FFF2-40B4-BE49-F238E27FC236}">
+                <a16:creationId xmlns:a16="http://schemas.microsoft.com/office/drawing/2014/main" id="{C7DF5213-63D0-450F-BCDA-39A54075B403}"/>
+              </a:ext>
+            </a:extLst>
+          </p:cNvPr>
+          <p:cNvCxnSpPr>
+            <a:cxnSpLocks/>
+            <a:stCxn id="2" idx="4"/>
+            <a:endCxn id="8" idx="0"/>
+          </p:cNvCxnSpPr>
+          <p:nvPr/>
+        </p:nvCxnSpPr>
+        <p:spPr>
+          <a:xfrm rot="5400000">
+            <a:off x="3584677" y="858675"/>
+            <a:ext cx="420995" cy="559790"/>
+          </a:xfrm>
+          <a:prstGeom prst="bentConnector3">
+            <a:avLst>
+              <a:gd name="adj1" fmla="val 50000"/>
+            </a:avLst>
+          </a:prstGeom>
+          <a:ln>
+            <a:tailEnd type="triangle"/>
+          </a:ln>
+        </p:spPr>
+        <p:style>
+          <a:lnRef idx="3">
+            <a:schemeClr val="accent4"/>
+          </a:lnRef>
+          <a:fillRef idx="0">
+            <a:schemeClr val="accent4"/>
+          </a:fillRef>
+          <a:effectRef idx="2">
+            <a:schemeClr val="accent4"/>
+          </a:effectRef>
+          <a:fontRef idx="minor">
+            <a:schemeClr val="tx1"/>
+          </a:fontRef>
+        </p:style>
+      </p:cxnSp>
+      <p:cxnSp>
+        <p:nvCxnSpPr>
+          <p:cNvPr id="64" name="Conector: Angulado 63">
+            <a:extLst>
+              <a:ext uri="{FF2B5EF4-FFF2-40B4-BE49-F238E27FC236}">
+                <a16:creationId xmlns:a16="http://schemas.microsoft.com/office/drawing/2014/main" id="{83E72DCF-2280-44DE-B6A2-2FAC5576FAB3}"/>
+              </a:ext>
+            </a:extLst>
+          </p:cNvPr>
+          <p:cNvCxnSpPr>
+            <a:cxnSpLocks/>
+          </p:cNvCxnSpPr>
+          <p:nvPr/>
+        </p:nvCxnSpPr>
+        <p:spPr>
+          <a:xfrm flipV="1">
+            <a:off x="6504895" y="3344819"/>
+            <a:ext cx="547542" cy="1"/>
+          </a:xfrm>
+          <a:prstGeom prst="bentConnector3">
+            <a:avLst>
+              <a:gd name="adj1" fmla="val 50000"/>
+            </a:avLst>
+          </a:prstGeom>
+          <a:ln>
+            <a:tailEnd type="triangle"/>
+          </a:ln>
+        </p:spPr>
+        <p:style>
+          <a:lnRef idx="3">
+            <a:schemeClr val="accent4"/>
+          </a:lnRef>
+          <a:fillRef idx="0">
+            <a:schemeClr val="accent4"/>
+          </a:fillRef>
+          <a:effectRef idx="2">
+            <a:schemeClr val="accent4"/>
+          </a:effectRef>
+          <a:fontRef idx="minor">
+            <a:schemeClr val="tx1"/>
+          </a:fontRef>
+        </p:style>
+      </p:cxnSp>
+      <p:cxnSp>
+        <p:nvCxnSpPr>
+          <p:cNvPr id="74" name="Conector: Angulado 73">
+            <a:extLst>
+              <a:ext uri="{FF2B5EF4-FFF2-40B4-BE49-F238E27FC236}">
+                <a16:creationId xmlns:a16="http://schemas.microsoft.com/office/drawing/2014/main" id="{F6A2A5D6-C862-48CA-BB3E-FFDF999A85AC}"/>
+              </a:ext>
+            </a:extLst>
+          </p:cNvPr>
+          <p:cNvCxnSpPr>
+            <a:cxnSpLocks/>
+            <a:stCxn id="42" idx="3"/>
+          </p:cNvCxnSpPr>
+          <p:nvPr/>
+        </p:nvCxnSpPr>
+        <p:spPr>
+          <a:xfrm flipH="1">
+            <a:off x="6841709" y="2426001"/>
+            <a:ext cx="2881672" cy="2617405"/>
+          </a:xfrm>
+          <a:prstGeom prst="bentConnector3">
+            <a:avLst>
+              <a:gd name="adj1" fmla="val -7933"/>
+            </a:avLst>
+          </a:prstGeom>
+          <a:ln>
+            <a:tailEnd type="triangle"/>
+          </a:ln>
+        </p:spPr>
+        <p:style>
+          <a:lnRef idx="3">
+            <a:schemeClr val="accent4"/>
+          </a:lnRef>
+          <a:fillRef idx="0">
+            <a:schemeClr val="accent4"/>
+          </a:fillRef>
+          <a:effectRef idx="2">
+            <a:schemeClr val="accent4"/>
           </a:effectRef>
           <a:fontRef idx="minor">
             <a:schemeClr val="tx1"/>

</xml_diff>